<commit_message>
CaaS Xamarin Session 2 slide update
</commit_message>
<xml_diff>
--- a/Mobile Development/Xamarin/Session 2 - Starting Mobile Development/Starting Mobile Development.pptx
+++ b/Mobile Development/Xamarin/Session 2 - Starting Mobile Development/Starting Mobile Development.pptx
@@ -212,7 +212,7 @@
           <a:p>
             <a:fld id="{49B60EF2-7028-489F-85D8-FE86CD7CF2A0}" type="datetimeFigureOut">
               <a:rPr lang="en-US" smtClean="0"/>
-              <a:t>1/22/2017</a:t>
+              <a:t>1/23/2017</a:t>
             </a:fld>
             <a:endParaRPr lang="en-US"/>
           </a:p>
@@ -2164,7 +2164,7 @@
           <a:p>
             <a:fld id="{0459C166-16D3-4A25-A2F8-C51E0E346B22}" type="datetimeFigureOut">
               <a:rPr lang="en-US" smtClean="0"/>
-              <a:t>1/22/2017</a:t>
+              <a:t>1/23/2017</a:t>
             </a:fld>
             <a:endParaRPr lang="en-US"/>
           </a:p>
@@ -2259,7 +2259,7 @@
           <a:p>
             <a:fld id="{0459C166-16D3-4A25-A2F8-C51E0E346B22}" type="datetimeFigureOut">
               <a:rPr lang="en-US" smtClean="0"/>
-              <a:t>1/22/2017</a:t>
+              <a:t>1/23/2017</a:t>
             </a:fld>
             <a:endParaRPr lang="en-US"/>
           </a:p>
@@ -2534,7 +2534,7 @@
           <a:p>
             <a:fld id="{0459C166-16D3-4A25-A2F8-C51E0E346B22}" type="datetimeFigureOut">
               <a:rPr lang="en-US" smtClean="0"/>
-              <a:t>1/22/2017</a:t>
+              <a:t>1/23/2017</a:t>
             </a:fld>
             <a:endParaRPr lang="en-US"/>
           </a:p>
@@ -2786,7 +2786,7 @@
           <a:p>
             <a:fld id="{0459C166-16D3-4A25-A2F8-C51E0E346B22}" type="datetimeFigureOut">
               <a:rPr lang="en-US" smtClean="0"/>
-              <a:t>1/22/2017</a:t>
+              <a:t>1/23/2017</a:t>
             </a:fld>
             <a:endParaRPr lang="en-US"/>
           </a:p>
@@ -2954,7 +2954,7 @@
           <a:p>
             <a:fld id="{0459C166-16D3-4A25-A2F8-C51E0E346B22}" type="datetimeFigureOut">
               <a:rPr lang="en-US" smtClean="0"/>
-              <a:t>1/22/2017</a:t>
+              <a:t>1/23/2017</a:t>
             </a:fld>
             <a:endParaRPr lang="en-US"/>
           </a:p>
@@ -3132,7 +3132,7 @@
           <a:p>
             <a:fld id="{0459C166-16D3-4A25-A2F8-C51E0E346B22}" type="datetimeFigureOut">
               <a:rPr lang="en-US" smtClean="0"/>
-              <a:t>1/22/2017</a:t>
+              <a:t>1/23/2017</a:t>
             </a:fld>
             <a:endParaRPr lang="en-US"/>
           </a:p>
@@ -4538,7 +4538,7 @@
           <a:p>
             <a:fld id="{0459C166-16D3-4A25-A2F8-C51E0E346B22}" type="datetimeFigureOut">
               <a:rPr lang="en-US" smtClean="0"/>
-              <a:t>1/22/2017</a:t>
+              <a:t>1/23/2017</a:t>
             </a:fld>
             <a:endParaRPr lang="en-US"/>
           </a:p>
@@ -10528,7 +10528,7 @@
             <a:fld id="{0459C166-16D3-4A25-A2F8-C51E0E346B22}" type="datetimeFigureOut">
               <a:rPr lang="en-US" smtClean="0"/>
               <a:pPr/>
-              <a:t>1/22/2017</a:t>
+              <a:t>1/23/2017</a:t>
             </a:fld>
             <a:endParaRPr lang="en-US"/>
           </a:p>
@@ -14586,7 +14586,7 @@
           <a:p>
             <a:fld id="{0459C166-16D3-4A25-A2F8-C51E0E346B22}" type="datetimeFigureOut">
               <a:rPr lang="en-US" smtClean="0"/>
-              <a:t>1/22/2017</a:t>
+              <a:t>1/23/2017</a:t>
             </a:fld>
             <a:endParaRPr lang="en-US"/>
           </a:p>
@@ -14950,7 +14950,7 @@
           <a:p>
             <a:fld id="{0459C166-16D3-4A25-A2F8-C51E0E346B22}" type="datetimeFigureOut">
               <a:rPr lang="en-US" smtClean="0"/>
-              <a:t>1/22/2017</a:t>
+              <a:t>1/23/2017</a:t>
             </a:fld>
             <a:endParaRPr lang="en-US"/>
           </a:p>
@@ -15067,7 +15067,7 @@
           <a:p>
             <a:fld id="{0459C166-16D3-4A25-A2F8-C51E0E346B22}" type="datetimeFigureOut">
               <a:rPr lang="en-US" smtClean="0"/>
-              <a:t>1/22/2017</a:t>
+              <a:t>1/23/2017</a:t>
             </a:fld>
             <a:endParaRPr lang="en-US"/>
           </a:p>
@@ -15278,7 +15278,7 @@
           <a:p>
             <a:fld id="{0459C166-16D3-4A25-A2F8-C51E0E346B22}" type="datetimeFigureOut">
               <a:rPr lang="en-US" smtClean="0"/>
-              <a:t>1/22/2017</a:t>
+              <a:t>1/23/2017</a:t>
             </a:fld>
             <a:endParaRPr lang="en-US"/>
           </a:p>
@@ -16747,24 +16747,19 @@
           <a:p>
             <a:r>
               <a:rPr lang="en-US" dirty="0"/>
-              <a:t>Azure App Service Mobile App code has access to a key for Azure Storage, which is used to generate </a:t>
-            </a:r>
+              <a:t>Azure App Service Mobile App code has access to a key for Azure Storage, which is used to generate temporary Shared Access Signatures (SAS) for Azure Storage blob operations.</a:t>
+            </a:r>
+          </a:p>
+          <a:p>
             <a:r>
               <a:rPr lang="en-US" dirty="0"/>
-              <a:t>temporary Shared Access Signatures (SAS) for Azure Storage blob operations.</a:t>
-            </a:r>
-            <a:endParaRPr lang="en-US" dirty="0"/>
+              <a:t>That code is exposed as a custom REST-based API end point</a:t>
+            </a:r>
           </a:p>
           <a:p>
             <a:r>
               <a:rPr lang="en-US" dirty="0"/>
-              <a:t>That code uses is exposed as a custom API REST-based end point</a:t>
-            </a:r>
-          </a:p>
-          <a:p>
-            <a:r>
-              <a:rPr lang="en-US" dirty="0"/>
-              <a:t>The mobile app calls the custom API end points to get a SAS</a:t>
+              <a:t>The mobile app calls the custom API end point to get a SAS</a:t>
             </a:r>
           </a:p>
           <a:p>

</xml_diff>